<commit_message>
Update all HPEG reports with demographics charts and improvements
</commit_message>
<xml_diff>
--- a/outputs/BHH_Exec_Team_Complaints_Sep-2025-Nov-2025.pptx
+++ b/outputs/BHH_Exec_Team_Complaints_Sep-2025-Nov-2025.pptx
@@ -3253,7 +3253,7 @@
               </a:defRPr>
             </a:pPr>
             <a:r>
-              <a:t>⚠ 12 cases open &gt;6 months</a:t>
+              <a:t>⚠ 13 cases open &gt;6 months</a:t>
             </a:r>
           </a:p>
         </p:txBody>
@@ -3680,7 +3680,7 @@
               </a:defRPr>
             </a:pPr>
             <a:r>
-              <a:t>BHH EXEC TEAM | Resolution Time by Complexity Level</a:t>
+              <a:t>BHH EXEC TEAM | Resolution Time by Complexity Level (Closed Cases Only)</a:t>
             </a:r>
           </a:p>
         </p:txBody>
@@ -4558,21 +4558,69 @@
               </a:defRPr>
             </a:pPr>
             <a:r>
-              <a:t>BHH EXEC TEAM | Risk Dashboard</a:t>
-            </a:r>
-          </a:p>
-        </p:txBody>
-      </p:sp>
-      <p:sp>
-        <p:nvSpPr>
-          <p:cNvPr id="3" name="TextBox 2"/>
+              <a:t>BHH EXEC TEAM | Demographics Overview</a:t>
+            </a:r>
+          </a:p>
+        </p:txBody>
+      </p:sp>
+      <p:pic>
+        <p:nvPicPr>
+          <p:cNvPr id="3" name="Picture 2" descr="BHH Exec Team_gender.png"/>
+          <p:cNvPicPr>
+            <a:picLocks noChangeAspect="1"/>
+          </p:cNvPicPr>
+          <p:nvPr/>
+        </p:nvPicPr>
+        <p:blipFill>
+          <a:blip r:embed="rId2"/>
+          <a:stretch>
+            <a:fillRect/>
+          </a:stretch>
+        </p:blipFill>
+        <p:spPr>
+          <a:xfrm>
+            <a:off x="457200" y="1188720"/>
+            <a:ext cx="5486400" cy="5785945"/>
+          </a:xfrm>
+          <a:prstGeom prst="rect">
+            <a:avLst/>
+          </a:prstGeom>
+        </p:spPr>
+      </p:pic>
+      <p:pic>
+        <p:nvPicPr>
+          <p:cNvPr id="4" name="Picture 3" descr="BHH Exec Team_ethnicity.png"/>
+          <p:cNvPicPr>
+            <a:picLocks noChangeAspect="1"/>
+          </p:cNvPicPr>
+          <p:nvPr/>
+        </p:nvPicPr>
+        <p:blipFill>
+          <a:blip r:embed="rId3"/>
+          <a:stretch>
+            <a:fillRect/>
+          </a:stretch>
+        </p:blipFill>
+        <p:spPr>
+          <a:xfrm>
+            <a:off x="6400800" y="1188720"/>
+            <a:ext cx="5486400" cy="4525818"/>
+          </a:xfrm>
+          <a:prstGeom prst="rect">
+            <a:avLst/>
+          </a:prstGeom>
+        </p:spPr>
+      </p:pic>
+      <p:sp>
+        <p:nvSpPr>
+          <p:cNvPr id="5" name="TextBox 4"/>
           <p:cNvSpPr txBox="1"/>
           <p:nvPr/>
         </p:nvSpPr>
         <p:spPr>
           <a:xfrm>
-            <a:off x="457200" y="1371600"/>
-            <a:ext cx="10972800" cy="457200"/>
+            <a:off x="731520" y="5943600"/>
+            <a:ext cx="10698480" cy="457200"/>
           </a:xfrm>
           <a:prstGeom prst="rect">
             <a:avLst/>
@@ -4585,30 +4633,30 @@
           </a:bodyPr>
           <a:lstStyle/>
           <a:p>
-            <a:pPr algn="l">
-              <a:defRPr sz="1600" b="1">
-                <a:solidFill>
-                  <a:srgbClr val="8A1538"/>
+            <a:pPr algn="ctr">
+              <a:defRPr sz="900" b="0">
+                <a:solidFill>
+                  <a:srgbClr val="768692"/>
                 </a:solidFill>
                 <a:latin typeface="Arial"/>
               </a:defRPr>
             </a:pPr>
             <a:r>
-              <a:t>Cases Open &gt;6 Months: 12</a:t>
-            </a:r>
-          </a:p>
-        </p:txBody>
-      </p:sp>
-      <p:sp>
-        <p:nvSpPr>
-          <p:cNvPr id="4" name="TextBox 3"/>
+              <a:t>Current Period: 161 total cases  |  Note: Age data not available in current dataset.</a:t>
+            </a:r>
+          </a:p>
+        </p:txBody>
+      </p:sp>
+      <p:sp>
+        <p:nvSpPr>
+          <p:cNvPr id="6" name="TextBox 5"/>
           <p:cNvSpPr txBox="1"/>
           <p:nvPr/>
         </p:nvSpPr>
         <p:spPr>
           <a:xfrm>
-            <a:off x="457200" y="3657600"/>
-            <a:ext cx="10972800" cy="914400"/>
+            <a:off x="731520" y="5303520"/>
+            <a:ext cx="10698480" cy="274320"/>
           </a:xfrm>
           <a:prstGeom prst="rect">
             <a:avLst/>
@@ -4622,19 +4670,87 @@
           <a:lstStyle/>
           <a:p>
             <a:pPr algn="l">
-              <a:defRPr sz="1100" b="0">
-                <a:solidFill>
-                  <a:srgbClr val="768692"/>
+              <a:defRPr sz="1100" b="1">
+                <a:solidFill>
+                  <a:srgbClr val="003087"/>
                 </a:solidFill>
                 <a:latin typeface="Arial"/>
               </a:defRPr>
             </a:pPr>
             <a:r>
-              <a:t>Detailed breakdowns available in operational dashboards.</a:t>
-            </a:r>
-            <a:br/>
-            <a:r>
-              <a:t>Focus on specialty-level resolution for long-standing cases.</a:t>
+              <a:t>Statistical Findings:</a:t>
+            </a:r>
+          </a:p>
+        </p:txBody>
+      </p:sp>
+      <p:sp>
+        <p:nvSpPr>
+          <p:cNvPr id="7" name="TextBox 6"/>
+          <p:cNvSpPr txBox="1"/>
+          <p:nvPr/>
+        </p:nvSpPr>
+        <p:spPr>
+          <a:xfrm>
+            <a:off x="914400" y="5577840"/>
+            <a:ext cx="10058400" cy="228600"/>
+          </a:xfrm>
+          <a:prstGeom prst="rect">
+            <a:avLst/>
+          </a:prstGeom>
+          <a:noFill/>
+        </p:spPr>
+        <p:txBody>
+          <a:bodyPr wrap="square">
+            <a:spAutoFit/>
+          </a:bodyPr>
+          <a:lstStyle/>
+          <a:p>
+            <a:pPr algn="l">
+              <a:defRPr sz="900" b="0">
+                <a:solidFill>
+                  <a:srgbClr val="231F20"/>
+                </a:solidFill>
+                <a:latin typeface="Arial"/>
+              </a:defRPr>
+            </a:pPr>
+            <a:r>
+              <a:t>• Topic 6 shows association with gender (p=0.011)</a:t>
+            </a:r>
+          </a:p>
+        </p:txBody>
+      </p:sp>
+      <p:sp>
+        <p:nvSpPr>
+          <p:cNvPr id="8" name="TextBox 7"/>
+          <p:cNvSpPr txBox="1"/>
+          <p:nvPr/>
+        </p:nvSpPr>
+        <p:spPr>
+          <a:xfrm>
+            <a:off x="914400" y="5852159"/>
+            <a:ext cx="10058400" cy="228600"/>
+          </a:xfrm>
+          <a:prstGeom prst="rect">
+            <a:avLst/>
+          </a:prstGeom>
+          <a:noFill/>
+        </p:spPr>
+        <p:txBody>
+          <a:bodyPr wrap="square">
+            <a:spAutoFit/>
+          </a:bodyPr>
+          <a:lstStyle/>
+          <a:p>
+            <a:pPr algn="l">
+              <a:defRPr sz="900" b="0">
+                <a:solidFill>
+                  <a:srgbClr val="231F20"/>
+                </a:solidFill>
+                <a:latin typeface="Arial"/>
+              </a:defRPr>
+            </a:pPr>
+            <a:r>
+              <a:t>• Topic 1 shows association with gender (p=0.043)</a:t>
             </a:r>
           </a:p>
         </p:txBody>
@@ -4835,8 +4951,8 @@
         </p:nvSpPr>
         <p:spPr>
           <a:xfrm>
-            <a:off x="457200" y="1371600"/>
-            <a:ext cx="10972800" cy="365760"/>
+            <a:off x="457200" y="1097280"/>
+            <a:ext cx="10972800" cy="457200"/>
           </a:xfrm>
           <a:prstGeom prst="rect">
             <a:avLst/>
@@ -4850,13 +4966,48 @@
           <a:lstStyle/>
           <a:p>
             <a:pPr>
-              <a:defRPr sz="1400" b="1">
-                <a:solidFill>
-                  <a:srgbClr val="005EB8"/>
+              <a:defRPr sz="1600" b="1">
+                <a:solidFill>
+                  <a:srgbClr val="AE2573"/>
                 </a:solidFill>
               </a:defRPr>
             </a:pPr>
             <a:r>
+              <a:t>Insert the Actions data for this HPEG</a:t>
+            </a:r>
+          </a:p>
+        </p:txBody>
+      </p:sp>
+      <p:sp>
+        <p:nvSpPr>
+          <p:cNvPr id="4" name="TextBox 3"/>
+          <p:cNvSpPr txBox="1"/>
+          <p:nvPr/>
+        </p:nvSpPr>
+        <p:spPr>
+          <a:xfrm>
+            <a:off x="457200" y="1371600"/>
+            <a:ext cx="10972800" cy="365760"/>
+          </a:xfrm>
+          <a:prstGeom prst="rect">
+            <a:avLst/>
+          </a:prstGeom>
+          <a:noFill/>
+        </p:spPr>
+        <p:txBody>
+          <a:bodyPr wrap="none">
+            <a:spAutoFit/>
+          </a:bodyPr>
+          <a:lstStyle/>
+          <a:p>
+            <a:pPr>
+              <a:defRPr sz="1400" b="1">
+                <a:solidFill>
+                  <a:srgbClr val="005EB8"/>
+                </a:solidFill>
+              </a:defRPr>
+            </a:pPr>
+            <a:r>
               <a:t>Outstanding Actions from Last Report</a:t>
             </a:r>
           </a:p>
@@ -4864,7 +5015,7 @@
       </p:sp>
       <p:sp>
         <p:nvSpPr>
-          <p:cNvPr id="4" name="TextBox 3"/>
+          <p:cNvPr id="5" name="TextBox 4"/>
           <p:cNvSpPr txBox="1"/>
           <p:nvPr/>
         </p:nvSpPr>
@@ -4907,7 +5058,7 @@
       </p:sp>
       <p:sp>
         <p:nvSpPr>
-          <p:cNvPr id="5" name="TextBox 4"/>
+          <p:cNvPr id="6" name="TextBox 5"/>
           <p:cNvSpPr txBox="1"/>
           <p:nvPr/>
         </p:nvSpPr>
@@ -4942,7 +5093,7 @@
       </p:sp>
       <p:sp>
         <p:nvSpPr>
-          <p:cNvPr id="6" name="TextBox 5"/>
+          <p:cNvPr id="7" name="TextBox 6"/>
           <p:cNvSpPr txBox="1"/>
           <p:nvPr/>
         </p:nvSpPr>
@@ -4985,7 +5136,7 @@
       </p:sp>
       <p:sp>
         <p:nvSpPr>
-          <p:cNvPr id="7" name="TextBox 6"/>
+          <p:cNvPr id="8" name="TextBox 7"/>
           <p:cNvSpPr txBox="1"/>
           <p:nvPr/>
         </p:nvSpPr>
@@ -5020,7 +5171,7 @@
       </p:sp>
       <p:sp>
         <p:nvSpPr>
-          <p:cNvPr id="8" name="TextBox 7"/>
+          <p:cNvPr id="9" name="TextBox 8"/>
           <p:cNvSpPr txBox="1"/>
           <p:nvPr/>
         </p:nvSpPr>
@@ -5140,8 +5291,8 @@
         </p:nvSpPr>
         <p:spPr>
           <a:xfrm>
-            <a:off x="457200" y="1371600"/>
-            <a:ext cx="10972800" cy="365760"/>
+            <a:off x="457200" y="1097280"/>
+            <a:ext cx="10972800" cy="457200"/>
           </a:xfrm>
           <a:prstGeom prst="rect">
             <a:avLst/>
@@ -5155,13 +5306,48 @@
           <a:lstStyle/>
           <a:p>
             <a:pPr>
-              <a:defRPr sz="1400" b="1">
-                <a:solidFill>
-                  <a:srgbClr val="005EB8"/>
+              <a:defRPr sz="1600" b="1">
+                <a:solidFill>
+                  <a:srgbClr val="AE2573"/>
                 </a:solidFill>
               </a:defRPr>
             </a:pPr>
             <a:r>
+              <a:t>Insert most recent DoNs table for this HPEG</a:t>
+            </a:r>
+          </a:p>
+        </p:txBody>
+      </p:sp>
+      <p:sp>
+        <p:nvSpPr>
+          <p:cNvPr id="4" name="TextBox 3"/>
+          <p:cNvSpPr txBox="1"/>
+          <p:nvPr/>
+        </p:nvSpPr>
+        <p:spPr>
+          <a:xfrm>
+            <a:off x="457200" y="1371600"/>
+            <a:ext cx="10972800" cy="365760"/>
+          </a:xfrm>
+          <a:prstGeom prst="rect">
+            <a:avLst/>
+          </a:prstGeom>
+          <a:noFill/>
+        </p:spPr>
+        <p:txBody>
+          <a:bodyPr wrap="none">
+            <a:spAutoFit/>
+          </a:bodyPr>
+          <a:lstStyle/>
+          <a:p>
+            <a:pPr>
+              <a:defRPr sz="1400" b="1">
+                <a:solidFill>
+                  <a:srgbClr val="005EB8"/>
+                </a:solidFill>
+              </a:defRPr>
+            </a:pPr>
+            <a:r>
               <a:t>Performance Highlights</a:t>
             </a:r>
           </a:p>
@@ -5169,7 +5355,7 @@
       </p:sp>
       <p:sp>
         <p:nvSpPr>
-          <p:cNvPr id="4" name="TextBox 3"/>
+          <p:cNvPr id="5" name="TextBox 4"/>
           <p:cNvSpPr txBox="1"/>
           <p:nvPr/>
         </p:nvSpPr>
@@ -5204,7 +5390,7 @@
       </p:sp>
       <p:sp>
         <p:nvSpPr>
-          <p:cNvPr id="5" name="TextBox 4"/>
+          <p:cNvPr id="6" name="TextBox 5"/>
           <p:cNvSpPr txBox="1"/>
           <p:nvPr/>
         </p:nvSpPr>
@@ -5239,7 +5425,7 @@
       </p:sp>
       <p:sp>
         <p:nvSpPr>
-          <p:cNvPr id="6" name="TextBox 5"/>
+          <p:cNvPr id="7" name="TextBox 6"/>
           <p:cNvSpPr txBox="1"/>
           <p:nvPr/>
         </p:nvSpPr>
@@ -6259,7 +6445,7 @@
         <p:spPr>
           <a:xfrm>
             <a:off x="457200" y="1005840"/>
-            <a:ext cx="10972800" cy="7275335"/>
+            <a:ext cx="10972800" cy="5918878"/>
           </a:xfrm>
           <a:prstGeom prst="rect">
             <a:avLst/>

</xml_diff>